<commit_message>
update collab net text, shorten, currently 2.4k chars, 350 words
</commit_message>
<xml_diff>
--- a/collab-net-figure.pptx
+++ b/collab-net-figure.pptx
@@ -288,7 +288,7 @@
           <a:p>
             <a:fld id="{3EB7087A-5004-7E42-8192-4DF395D68CCF}" type="datetimeFigureOut">
               <a:rPr lang="en-US" smtClean="0"/>
-              <a:t>8/5/17</a:t>
+              <a:t>8/23/17</a:t>
             </a:fld>
             <a:endParaRPr lang="en-US"/>
           </a:p>
@@ -458,7 +458,7 @@
           <a:p>
             <a:fld id="{3EB7087A-5004-7E42-8192-4DF395D68CCF}" type="datetimeFigureOut">
               <a:rPr lang="en-US" smtClean="0"/>
-              <a:t>8/5/17</a:t>
+              <a:t>8/23/17</a:t>
             </a:fld>
             <a:endParaRPr lang="en-US"/>
           </a:p>
@@ -638,7 +638,7 @@
           <a:p>
             <a:fld id="{3EB7087A-5004-7E42-8192-4DF395D68CCF}" type="datetimeFigureOut">
               <a:rPr lang="en-US" smtClean="0"/>
-              <a:t>8/5/17</a:t>
+              <a:t>8/23/17</a:t>
             </a:fld>
             <a:endParaRPr lang="en-US"/>
           </a:p>
@@ -808,7 +808,7 @@
           <a:p>
             <a:fld id="{3EB7087A-5004-7E42-8192-4DF395D68CCF}" type="datetimeFigureOut">
               <a:rPr lang="en-US" smtClean="0"/>
-              <a:t>8/5/17</a:t>
+              <a:t>8/23/17</a:t>
             </a:fld>
             <a:endParaRPr lang="en-US"/>
           </a:p>
@@ -1054,7 +1054,7 @@
           <a:p>
             <a:fld id="{3EB7087A-5004-7E42-8192-4DF395D68CCF}" type="datetimeFigureOut">
               <a:rPr lang="en-US" smtClean="0"/>
-              <a:t>8/5/17</a:t>
+              <a:t>8/23/17</a:t>
             </a:fld>
             <a:endParaRPr lang="en-US"/>
           </a:p>
@@ -1342,7 +1342,7 @@
           <a:p>
             <a:fld id="{3EB7087A-5004-7E42-8192-4DF395D68CCF}" type="datetimeFigureOut">
               <a:rPr lang="en-US" smtClean="0"/>
-              <a:t>8/5/17</a:t>
+              <a:t>8/23/17</a:t>
             </a:fld>
             <a:endParaRPr lang="en-US"/>
           </a:p>
@@ -1764,7 +1764,7 @@
           <a:p>
             <a:fld id="{3EB7087A-5004-7E42-8192-4DF395D68CCF}" type="datetimeFigureOut">
               <a:rPr lang="en-US" smtClean="0"/>
-              <a:t>8/5/17</a:t>
+              <a:t>8/23/17</a:t>
             </a:fld>
             <a:endParaRPr lang="en-US"/>
           </a:p>
@@ -1882,7 +1882,7 @@
           <a:p>
             <a:fld id="{3EB7087A-5004-7E42-8192-4DF395D68CCF}" type="datetimeFigureOut">
               <a:rPr lang="en-US" smtClean="0"/>
-              <a:t>8/5/17</a:t>
+              <a:t>8/23/17</a:t>
             </a:fld>
             <a:endParaRPr lang="en-US"/>
           </a:p>
@@ -1977,7 +1977,7 @@
           <a:p>
             <a:fld id="{3EB7087A-5004-7E42-8192-4DF395D68CCF}" type="datetimeFigureOut">
               <a:rPr lang="en-US" smtClean="0"/>
-              <a:t>8/5/17</a:t>
+              <a:t>8/23/17</a:t>
             </a:fld>
             <a:endParaRPr lang="en-US"/>
           </a:p>
@@ -2254,7 +2254,7 @@
           <a:p>
             <a:fld id="{3EB7087A-5004-7E42-8192-4DF395D68CCF}" type="datetimeFigureOut">
               <a:rPr lang="en-US" smtClean="0"/>
-              <a:t>8/5/17</a:t>
+              <a:t>8/23/17</a:t>
             </a:fld>
             <a:endParaRPr lang="en-US"/>
           </a:p>
@@ -2507,7 +2507,7 @@
           <a:p>
             <a:fld id="{3EB7087A-5004-7E42-8192-4DF395D68CCF}" type="datetimeFigureOut">
               <a:rPr lang="en-US" smtClean="0"/>
-              <a:t>8/5/17</a:t>
+              <a:t>8/23/17</a:t>
             </a:fld>
             <a:endParaRPr lang="en-US"/>
           </a:p>
@@ -2720,7 +2720,7 @@
           <a:p>
             <a:fld id="{3EB7087A-5004-7E42-8192-4DF395D68CCF}" type="datetimeFigureOut">
               <a:rPr lang="en-US" smtClean="0"/>
-              <a:t>8/5/17</a:t>
+              <a:t>8/23/17</a:t>
             </a:fld>
             <a:endParaRPr lang="en-US"/>
           </a:p>
@@ -3436,7 +3436,15 @@
                   <a:schemeClr val="tx1"/>
                 </a:solidFill>
               </a:rPr>
-              <a:t>(Image Workflows)</a:t>
+              <a:t>(Image </a:t>
+            </a:r>
+            <a:r>
+              <a:rPr lang="en-US" sz="1600" dirty="0" smtClean="0">
+                <a:solidFill>
+                  <a:schemeClr val="tx1"/>
+                </a:solidFill>
+              </a:rPr>
+              <a:t>Analysis/Perturbation Data)</a:t>
             </a:r>
             <a:endParaRPr lang="en-US" sz="1600" dirty="0">
               <a:solidFill>
@@ -3454,7 +3462,7 @@
         </p:nvSpPr>
         <p:spPr>
           <a:xfrm>
-            <a:off x="333830" y="3723521"/>
+            <a:off x="333830" y="2979159"/>
             <a:ext cx="2358571" cy="1312333"/>
           </a:xfrm>
           <a:prstGeom prst="ellipse">
@@ -3569,14 +3577,14 @@
           <p:cNvPr id="19" name="Straight Arrow Connector 18"/>
           <p:cNvCxnSpPr>
             <a:stCxn id="13" idx="6"/>
-            <a:endCxn id="4" idx="3"/>
+            <a:endCxn id="4" idx="2"/>
           </p:cNvCxnSpPr>
           <p:nvPr/>
         </p:nvCxnSpPr>
         <p:spPr>
           <a:xfrm flipV="1">
-            <a:off x="2692401" y="3892980"/>
-            <a:ext cx="1045719" cy="486708"/>
+            <a:off x="2692401" y="3429001"/>
+            <a:ext cx="700314" cy="206325"/>
           </a:xfrm>
           <a:prstGeom prst="straightConnector1">
             <a:avLst/>
@@ -3673,7 +3681,15 @@
                   <a:schemeClr val="tx1"/>
                 </a:solidFill>
               </a:rPr>
-              <a:t>(Fast Equivalence Classes)</a:t>
+              <a:t>(Fast </a:t>
+            </a:r>
+            <a:r>
+              <a:rPr lang="en-US" sz="1600" dirty="0" smtClean="0">
+                <a:solidFill>
+                  <a:schemeClr val="tx1"/>
+                </a:solidFill>
+              </a:rPr>
+              <a:t>Expression Perturbation Analysis)</a:t>
             </a:r>
             <a:endParaRPr lang="en-US" sz="1600" dirty="0">
               <a:solidFill>
@@ -3876,6 +3892,143 @@
               <a:rPr lang="en-US" dirty="0" smtClean="0"/>
               <a:t>Workflows</a:t>
             </a:r>
+          </a:p>
+        </p:txBody>
+      </p:sp>
+      <p:cxnSp>
+        <p:nvCxnSpPr>
+          <p:cNvPr id="16" name="Straight Arrow Connector 15"/>
+          <p:cNvCxnSpPr/>
+          <p:nvPr/>
+        </p:nvCxnSpPr>
+        <p:spPr>
+          <a:xfrm>
+            <a:off x="4567464" y="5035854"/>
+            <a:ext cx="1724480" cy="390469"/>
+          </a:xfrm>
+          <a:prstGeom prst="straightConnector1">
+            <a:avLst/>
+          </a:prstGeom>
+          <a:ln w="38100" cmpd="sng">
+            <a:solidFill>
+              <a:srgbClr val="000000"/>
+            </a:solidFill>
+            <a:headEnd type="none"/>
+            <a:tailEnd type="arrow"/>
+          </a:ln>
+          <a:effectLst/>
+        </p:spPr>
+        <p:style>
+          <a:lnRef idx="2">
+            <a:schemeClr val="accent1"/>
+          </a:lnRef>
+          <a:fillRef idx="0">
+            <a:schemeClr val="accent1"/>
+          </a:fillRef>
+          <a:effectRef idx="1">
+            <a:schemeClr val="accent1"/>
+          </a:effectRef>
+          <a:fontRef idx="minor">
+            <a:schemeClr val="tx1"/>
+          </a:fontRef>
+        </p:style>
+      </p:cxnSp>
+      <p:sp>
+        <p:nvSpPr>
+          <p:cNvPr id="21" name="Oval 20"/>
+          <p:cNvSpPr/>
+          <p:nvPr/>
+        </p:nvSpPr>
+        <p:spPr>
+          <a:xfrm>
+            <a:off x="6006440" y="5230446"/>
+            <a:ext cx="2358571" cy="1312333"/>
+          </a:xfrm>
+          <a:prstGeom prst="ellipse">
+            <a:avLst/>
+          </a:prstGeom>
+          <a:solidFill>
+            <a:schemeClr val="bg1"/>
+          </a:solidFill>
+          <a:ln w="38100" cmpd="sng">
+            <a:solidFill>
+              <a:schemeClr val="tx1"/>
+            </a:solidFill>
+          </a:ln>
+          <a:effectLst/>
+        </p:spPr>
+        <p:style>
+          <a:lnRef idx="1">
+            <a:schemeClr val="accent1"/>
+          </a:lnRef>
+          <a:fillRef idx="3">
+            <a:schemeClr val="accent1"/>
+          </a:fillRef>
+          <a:effectRef idx="2">
+            <a:schemeClr val="accent1"/>
+          </a:effectRef>
+          <a:fontRef idx="minor">
+            <a:schemeClr val="lt1"/>
+          </a:fontRef>
+        </p:style>
+        <p:txBody>
+          <a:bodyPr rtlCol="0" anchor="ctr"/>
+          <a:lstStyle/>
+          <a:p>
+            <a:pPr algn="ctr"/>
+            <a:r>
+              <a:rPr lang="en-US" dirty="0" err="1" smtClean="0">
+                <a:solidFill>
+                  <a:schemeClr val="tx1"/>
+                </a:solidFill>
+              </a:rPr>
+              <a:t>Garmire</a:t>
+            </a:r>
+            <a:r>
+              <a:rPr lang="en-US" dirty="0" smtClean="0">
+                <a:solidFill>
+                  <a:schemeClr val="tx1"/>
+                </a:solidFill>
+              </a:rPr>
+              <a:t> Lab</a:t>
+            </a:r>
+            <a:endParaRPr lang="en-US" dirty="0" smtClean="0">
+              <a:solidFill>
+                <a:schemeClr val="tx1"/>
+              </a:solidFill>
+            </a:endParaRPr>
+          </a:p>
+          <a:p>
+            <a:pPr algn="ctr"/>
+            <a:r>
+              <a:rPr lang="en-US" sz="1600" dirty="0" smtClean="0">
+                <a:solidFill>
+                  <a:schemeClr val="tx1"/>
+                </a:solidFill>
+              </a:rPr>
+              <a:t>(</a:t>
+            </a:r>
+            <a:r>
+              <a:rPr lang="en-US" sz="1600" dirty="0" err="1" smtClean="0">
+                <a:solidFill>
+                  <a:schemeClr val="tx1"/>
+                </a:solidFill>
+              </a:rPr>
+              <a:t>ssRNA</a:t>
+            </a:r>
+            <a:r>
+              <a:rPr lang="en-US" sz="1600" dirty="0" smtClean="0">
+                <a:solidFill>
+                  <a:schemeClr val="tx1"/>
+                </a:solidFill>
+              </a:rPr>
+              <a:t>-Seq Graphical Workflows)</a:t>
+            </a:r>
+            <a:endParaRPr lang="en-US" sz="1600" dirty="0">
+              <a:solidFill>
+                <a:schemeClr val="tx1"/>
+              </a:solidFill>
+            </a:endParaRPr>
           </a:p>
         </p:txBody>
       </p:sp>

</xml_diff>